<commit_message>
the end of ppt
</commit_message>
<xml_diff>
--- a/TP/Soutenance.pptx
+++ b/TP/Soutenance.pptx
@@ -14,8 +14,8 @@
     <p:sldId id="264" r:id="rId8"/>
     <p:sldId id="265" r:id="rId9"/>
     <p:sldId id="261" r:id="rId10"/>
-    <p:sldId id="266" r:id="rId11"/>
-    <p:sldId id="262" r:id="rId12"/>
+    <p:sldId id="262" r:id="rId11"/>
+    <p:sldId id="267" r:id="rId12"/>
   </p:sldIdLst>
   <p:sldSz cx="12192000" cy="6858000"/>
   <p:notesSz cx="6858000" cy="9144000"/>
@@ -114,6 +114,11 @@
       </a:defRPr>
     </a:lvl9pPr>
   </p:defaultTextStyle>
+  <p:extLst>
+    <p:ext uri="{EFAFB233-063F-42B5-8137-9DF3F51BA10A}">
+      <p15:sldGuideLst xmlns:p15="http://schemas.microsoft.com/office/powerpoint/2012/main"/>
+    </p:ext>
+  </p:extLst>
 </p:presentation>
 </file>
 
@@ -626,7 +631,7 @@
             <a:fld id="{E9462EF3-3C4F-43EE-ACEE-D4B806740EA3}" type="datetimeFigureOut">
               <a:rPr lang="en-US" dirty="0"/>
               <a:pPr/>
-              <a:t>1/2/2017</a:t>
+              <a:t>1/3/2017</a:t>
             </a:fld>
             <a:endParaRPr lang="en-US" dirty="0"/>
           </a:p>
@@ -1608,7 +1613,7 @@
           <a:p>
             <a:fld id="{36343B39-165A-4B68-AA5C-581F5336313C}" type="datetimeFigureOut">
               <a:rPr lang="en-US" dirty="0"/>
-              <a:t>1/2/2017</a:t>
+              <a:t>1/3/2017</a:t>
             </a:fld>
             <a:endParaRPr lang="en-US" dirty="0"/>
           </a:p>
@@ -2478,7 +2483,7 @@
           <a:p>
             <a:fld id="{942C8C57-33F9-4259-AC4F-0E3F5BEC9B94}" type="datetimeFigureOut">
               <a:rPr lang="en-US" dirty="0"/>
-              <a:t>1/2/2017</a:t>
+              <a:t>1/3/2017</a:t>
             </a:fld>
             <a:endParaRPr lang="en-US" dirty="0"/>
           </a:p>
@@ -3499,7 +3504,7 @@
           <a:p>
             <a:fld id="{8748772B-8FA2-401F-A0A1-A59855EDBC3E}" type="datetimeFigureOut">
               <a:rPr lang="en-US" dirty="0"/>
-              <a:t>1/2/2017</a:t>
+              <a:t>1/3/2017</a:t>
             </a:fld>
             <a:endParaRPr lang="en-US" dirty="0"/>
           </a:p>
@@ -4419,7 +4424,7 @@
           <a:p>
             <a:fld id="{D3DD5BDE-5A90-4611-82E9-0FC5746D30C5}" type="datetimeFigureOut">
               <a:rPr lang="en-US" dirty="0"/>
-              <a:t>1/2/2017</a:t>
+              <a:t>1/3/2017</a:t>
             </a:fld>
             <a:endParaRPr lang="en-US" dirty="0"/>
           </a:p>
@@ -5075,7 +5080,7 @@
           <a:p>
             <a:fld id="{1ADDA17D-0BEA-4E76-A7FC-F7C188BC48D1}" type="datetimeFigureOut">
               <a:rPr lang="en-US" dirty="0"/>
-              <a:t>1/2/2017</a:t>
+              <a:t>1/3/2017</a:t>
             </a:fld>
             <a:endParaRPr lang="en-US" dirty="0"/>
           </a:p>
@@ -5932,7 +5937,7 @@
           <a:p>
             <a:fld id="{6909AC7D-18CA-4236-82B9-D75EB1D66EAE}" type="datetimeFigureOut">
               <a:rPr lang="en-US" dirty="0"/>
-              <a:t>1/2/2017</a:t>
+              <a:t>1/3/2017</a:t>
             </a:fld>
             <a:endParaRPr lang="en-US" dirty="0"/>
           </a:p>
@@ -6115,7 +6120,7 @@
           <a:p>
             <a:fld id="{5568300E-C023-45CD-A0BE-EDB7A8C6EA8B}" type="datetimeFigureOut">
               <a:rPr lang="en-US" dirty="0"/>
-              <a:t>1/2/2017</a:t>
+              <a:t>1/3/2017</a:t>
             </a:fld>
             <a:endParaRPr lang="en-US" dirty="0"/>
           </a:p>
@@ -6972,7 +6977,7 @@
           <a:p>
             <a:fld id="{3B620EAD-E369-4933-8469-ED7764B56A1B}" type="datetimeFigureOut">
               <a:rPr lang="en-US" dirty="0"/>
-              <a:t>1/2/2017</a:t>
+              <a:t>1/3/2017</a:t>
             </a:fld>
             <a:endParaRPr lang="en-US" dirty="0"/>
           </a:p>
@@ -7191,7 +7196,7 @@
           <a:p>
             <a:fld id="{076C0EF2-9919-473B-8215-8616BAF10692}" type="datetimeFigureOut">
               <a:rPr lang="en-US" dirty="0"/>
-              <a:t>1/2/2017</a:t>
+              <a:t>1/3/2017</a:t>
             </a:fld>
             <a:endParaRPr lang="en-US" dirty="0"/>
           </a:p>
@@ -8116,7 +8121,7 @@
           <a:p>
             <a:fld id="{A09472EB-AC54-4713-BFC2-BEB621108C63}" type="datetimeFigureOut">
               <a:rPr lang="en-US" dirty="0"/>
-              <a:t>1/2/2017</a:t>
+              <a:t>1/3/2017</a:t>
             </a:fld>
             <a:endParaRPr lang="en-US" dirty="0"/>
           </a:p>
@@ -8400,7 +8405,7 @@
           <a:p>
             <a:fld id="{99455A0C-791E-4545-B787-F98AD45CD761}" type="datetimeFigureOut">
               <a:rPr lang="en-US" dirty="0"/>
-              <a:t>1/2/2017</a:t>
+              <a:t>1/3/2017</a:t>
             </a:fld>
             <a:endParaRPr lang="en-US" dirty="0"/>
           </a:p>
@@ -8790,7 +8795,7 @@
           <a:p>
             <a:fld id="{42536B77-F4F4-4427-AC4F-9A623798AD82}" type="datetimeFigureOut">
               <a:rPr lang="en-US" dirty="0"/>
-              <a:t>1/2/2017</a:t>
+              <a:t>1/3/2017</a:t>
             </a:fld>
             <a:endParaRPr lang="en-US" dirty="0"/>
           </a:p>
@@ -8916,7 +8921,7 @@
           <a:p>
             <a:fld id="{D8BE790C-34EB-4565-8437-CACF4CDB7822}" type="datetimeFigureOut">
               <a:rPr lang="en-US" dirty="0"/>
-              <a:t>1/2/2017</a:t>
+              <a:t>1/3/2017</a:t>
             </a:fld>
             <a:endParaRPr lang="en-US" dirty="0"/>
           </a:p>
@@ -9011,7 +9016,7 @@
           <a:p>
             <a:fld id="{F84A4C11-22B8-4A4E-8126-B3AF6B948A8E}" type="datetimeFigureOut">
               <a:rPr lang="en-US" dirty="0"/>
-              <a:t>1/2/2017</a:t>
+              <a:t>1/3/2017</a:t>
             </a:fld>
             <a:endParaRPr lang="en-US" dirty="0"/>
           </a:p>
@@ -9982,7 +9987,7 @@
           <a:p>
             <a:fld id="{16ED06B6-C816-4861-964D-15A98395707D}" type="datetimeFigureOut">
               <a:rPr lang="en-US" dirty="0"/>
-              <a:t>1/2/2017</a:t>
+              <a:t>1/3/2017</a:t>
             </a:fld>
             <a:endParaRPr lang="en-US" dirty="0"/>
           </a:p>
@@ -10977,7 +10982,7 @@
           <a:p>
             <a:fld id="{00B1A8AB-EA7C-4B1B-9D73-E2551851FABE}" type="datetimeFigureOut">
               <a:rPr lang="en-US" dirty="0"/>
-              <a:t>1/2/2017</a:t>
+              <a:t>1/3/2017</a:t>
             </a:fld>
             <a:endParaRPr lang="en-US" dirty="0"/>
           </a:p>
@@ -11861,7 +11866,7 @@
           <a:p>
             <a:fld id="{90786BE5-D2A3-4BF0-8B30-D7403E61B3DC}" type="datetimeFigureOut">
               <a:rPr lang="en-US" dirty="0"/>
-              <a:t>1/2/2017</a:t>
+              <a:t>1/3/2017</a:t>
             </a:fld>
             <a:endParaRPr lang="en-US" dirty="0"/>
           </a:p>
@@ -12843,7 +12848,7 @@
           <a:p>
             <a:r>
               <a:rPr lang="fr-FR" dirty="0" smtClean="0"/>
-              <a:t>Résultats</a:t>
+              <a:t>Conclusion	</a:t>
             </a:r>
             <a:endParaRPr lang="en-GB" dirty="0"/>
           </a:p>
@@ -12864,14 +12869,37 @@
           <a:bodyPr/>
           <a:lstStyle/>
           <a:p>
-            <a:endParaRPr lang="en-GB"/>
+            <a:r>
+              <a:rPr lang="fr-FR" dirty="0" smtClean="0"/>
+              <a:t>Apprentissage de l’utilisation des heuristiques</a:t>
+            </a:r>
+          </a:p>
+          <a:p>
+            <a:r>
+              <a:rPr lang="fr-FR" dirty="0" smtClean="0"/>
+              <a:t>Une solution initiale avec un bon résultat n’est pas la solution de base qui permet d’obtenir la meilleure solution avec les algorithmes de parcours</a:t>
+            </a:r>
+          </a:p>
+          <a:p>
+            <a:r>
+              <a:rPr lang="fr-FR" dirty="0" smtClean="0"/>
+              <a:t>Meilleure connaissance pour résoudre les fuites mémoires</a:t>
+            </a:r>
+            <a:endParaRPr lang="fr-FR" dirty="0" smtClean="0"/>
+          </a:p>
+          <a:p>
+            <a:r>
+              <a:rPr lang="fr-FR" dirty="0" smtClean="0"/>
+              <a:t>Méthode récursive limitée en terme de nombre d’appels récursifs</a:t>
+            </a:r>
+            <a:endParaRPr lang="en-GB" dirty="0"/>
           </a:p>
         </p:txBody>
       </p:sp>
     </p:spTree>
     <p:extLst>
       <p:ext uri="{BB962C8B-B14F-4D97-AF65-F5344CB8AC3E}">
-        <p14:creationId xmlns:p14="http://schemas.microsoft.com/office/powerpoint/2010/main" val="2193136436"/>
+        <p14:creationId xmlns:p14="http://schemas.microsoft.com/office/powerpoint/2010/main" val="1788104246"/>
       </p:ext>
     </p:extLst>
   </p:cSld>
@@ -12915,35 +12943,626 @@
           <a:p>
             <a:r>
               <a:rPr lang="fr-FR" dirty="0" smtClean="0"/>
-              <a:t>Conclusion	</a:t>
+              <a:t>Merci pour votre écoute</a:t>
             </a:r>
             <a:endParaRPr lang="en-GB" dirty="0"/>
           </a:p>
         </p:txBody>
       </p:sp>
-      <p:sp>
-        <p:nvSpPr>
-          <p:cNvPr id="3" name="Espace réservé du contenu 2"/>
-          <p:cNvSpPr>
-            <a:spLocks noGrp="1"/>
-          </p:cNvSpPr>
+      <p:graphicFrame>
+        <p:nvGraphicFramePr>
+          <p:cNvPr id="4" name="Espace réservé du contenu 3"/>
+          <p:cNvGraphicFramePr>
+            <a:graphicFrameLocks noGrp="1"/>
+          </p:cNvGraphicFramePr>
           <p:nvPr>
             <p:ph idx="1"/>
           </p:nvPr>
-        </p:nvSpPr>
-        <p:spPr/>
-        <p:txBody>
-          <a:bodyPr/>
-          <a:lstStyle/>
-          <a:p>
-            <a:endParaRPr lang="en-GB"/>
-          </a:p>
-        </p:txBody>
-      </p:sp>
+        </p:nvGraphicFramePr>
+        <p:xfrm>
+          <a:off x="1155700" y="2603500"/>
+          <a:ext cx="8824912" cy="3708400"/>
+        </p:xfrm>
+        <a:graphic>
+          <a:graphicData uri="http://schemas.openxmlformats.org/drawingml/2006/table">
+            <a:tbl>
+              <a:tblPr firstRow="1" bandRow="1">
+                <a:tableStyleId>{5C22544A-7EE6-4342-B048-85BDC9FD1C3A}</a:tableStyleId>
+              </a:tblPr>
+              <a:tblGrid>
+                <a:gridCol w="2206228"/>
+                <a:gridCol w="2206228"/>
+                <a:gridCol w="2206228"/>
+                <a:gridCol w="2206228"/>
+              </a:tblGrid>
+              <a:tr h="370840">
+                <a:tc>
+                  <a:txBody>
+                    <a:bodyPr/>
+                    <a:lstStyle/>
+                    <a:p>
+                      <a:r>
+                        <a:rPr lang="fr-FR" dirty="0" smtClean="0"/>
+                        <a:t>Instances</a:t>
+                      </a:r>
+                      <a:endParaRPr lang="en-GB" dirty="0"/>
+                    </a:p>
+                  </a:txBody>
+                  <a:tcPr/>
+                </a:tc>
+                <a:tc>
+                  <a:txBody>
+                    <a:bodyPr/>
+                    <a:lstStyle/>
+                    <a:p>
+                      <a:r>
+                        <a:rPr lang="fr-FR" dirty="0" smtClean="0"/>
+                        <a:t>Résultats</a:t>
+                      </a:r>
+                      <a:endParaRPr lang="en-GB" dirty="0"/>
+                    </a:p>
+                  </a:txBody>
+                  <a:tcPr/>
+                </a:tc>
+                <a:tc>
+                  <a:txBody>
+                    <a:bodyPr/>
+                    <a:lstStyle/>
+                    <a:p>
+                      <a:r>
+                        <a:rPr lang="fr-FR" dirty="0" smtClean="0"/>
+                        <a:t>Instances</a:t>
+                      </a:r>
+                      <a:endParaRPr lang="en-GB" dirty="0"/>
+                    </a:p>
+                  </a:txBody>
+                  <a:tcPr/>
+                </a:tc>
+                <a:tc>
+                  <a:txBody>
+                    <a:bodyPr/>
+                    <a:lstStyle/>
+                    <a:p>
+                      <a:r>
+                        <a:rPr lang="fr-FR" dirty="0" smtClean="0"/>
+                        <a:t>Résultats</a:t>
+                      </a:r>
+                      <a:endParaRPr lang="en-GB" dirty="0"/>
+                    </a:p>
+                  </a:txBody>
+                  <a:tcPr/>
+                </a:tc>
+              </a:tr>
+              <a:tr h="370840">
+                <a:tc>
+                  <a:txBody>
+                    <a:bodyPr/>
+                    <a:lstStyle/>
+                    <a:p>
+                      <a:r>
+                        <a:rPr lang="fr-FR" dirty="0" smtClean="0"/>
+                        <a:t>100Md5_1_1</a:t>
+                      </a:r>
+                      <a:endParaRPr lang="en-GB" dirty="0"/>
+                    </a:p>
+                  </a:txBody>
+                  <a:tcPr/>
+                </a:tc>
+                <a:tc>
+                  <a:txBody>
+                    <a:bodyPr/>
+                    <a:lstStyle/>
+                    <a:p>
+                      <a:r>
+                        <a:rPr lang="fr-FR" dirty="0" smtClean="0"/>
+                        <a:t>33018</a:t>
+                      </a:r>
+                      <a:endParaRPr lang="en-GB" dirty="0"/>
+                    </a:p>
+                  </a:txBody>
+                  <a:tcPr/>
+                </a:tc>
+                <a:tc>
+                  <a:txBody>
+                    <a:bodyPr/>
+                    <a:lstStyle/>
+                    <a:p>
+                      <a:r>
+                        <a:rPr lang="fr-FR" dirty="0" smtClean="0"/>
+                        <a:t>250Md5_2_1</a:t>
+                      </a:r>
+                      <a:endParaRPr lang="en-GB" dirty="0"/>
+                    </a:p>
+                  </a:txBody>
+                  <a:tcPr/>
+                </a:tc>
+                <a:tc>
+                  <a:txBody>
+                    <a:bodyPr/>
+                    <a:lstStyle/>
+                    <a:p>
+                      <a:r>
+                        <a:rPr lang="fr-FR" dirty="0" smtClean="0"/>
+                        <a:t>82821</a:t>
+                      </a:r>
+                      <a:endParaRPr lang="en-GB" dirty="0"/>
+                    </a:p>
+                  </a:txBody>
+                  <a:tcPr/>
+                </a:tc>
+              </a:tr>
+              <a:tr h="370840">
+                <a:tc>
+                  <a:txBody>
+                    <a:bodyPr/>
+                    <a:lstStyle/>
+                    <a:p>
+                      <a:r>
+                        <a:rPr lang="fr-FR" dirty="0" smtClean="0"/>
+                        <a:t>100Md5_1_2</a:t>
+                      </a:r>
+                      <a:endParaRPr lang="en-GB" dirty="0"/>
+                    </a:p>
+                  </a:txBody>
+                  <a:tcPr/>
+                </a:tc>
+                <a:tc>
+                  <a:txBody>
+                    <a:bodyPr/>
+                    <a:lstStyle/>
+                    <a:p>
+                      <a:r>
+                        <a:rPr lang="fr-FR" dirty="0" smtClean="0"/>
+                        <a:t>29073</a:t>
+                      </a:r>
+                      <a:endParaRPr lang="en-GB" dirty="0"/>
+                    </a:p>
+                  </a:txBody>
+                  <a:tcPr/>
+                </a:tc>
+                <a:tc>
+                  <a:txBody>
+                    <a:bodyPr/>
+                    <a:lstStyle/>
+                    <a:p>
+                      <a:r>
+                        <a:rPr lang="fr-FR" dirty="0" smtClean="0"/>
+                        <a:t>250Md5_2_2</a:t>
+                      </a:r>
+                      <a:endParaRPr lang="en-GB" dirty="0"/>
+                    </a:p>
+                  </a:txBody>
+                  <a:tcPr/>
+                </a:tc>
+                <a:tc>
+                  <a:txBody>
+                    <a:bodyPr/>
+                    <a:lstStyle/>
+                    <a:p>
+                      <a:r>
+                        <a:rPr lang="fr-FR" dirty="0" smtClean="0"/>
+                        <a:t>76835</a:t>
+                      </a:r>
+                      <a:endParaRPr lang="en-GB" dirty="0"/>
+                    </a:p>
+                  </a:txBody>
+                  <a:tcPr/>
+                </a:tc>
+              </a:tr>
+              <a:tr h="370840">
+                <a:tc>
+                  <a:txBody>
+                    <a:bodyPr/>
+                    <a:lstStyle/>
+                    <a:p>
+                      <a:r>
+                        <a:rPr lang="fr-FR" dirty="0" smtClean="0"/>
+                        <a:t>100Md5_1_5</a:t>
+                      </a:r>
+                      <a:endParaRPr lang="en-GB" dirty="0"/>
+                    </a:p>
+                  </a:txBody>
+                  <a:tcPr/>
+                </a:tc>
+                <a:tc>
+                  <a:txBody>
+                    <a:bodyPr/>
+                    <a:lstStyle/>
+                    <a:p>
+                      <a:r>
+                        <a:rPr lang="fr-FR" dirty="0" smtClean="0"/>
+                        <a:t>22130</a:t>
+                      </a:r>
+                      <a:endParaRPr lang="en-GB" dirty="0"/>
+                    </a:p>
+                  </a:txBody>
+                  <a:tcPr/>
+                </a:tc>
+                <a:tc>
+                  <a:txBody>
+                    <a:bodyPr/>
+                    <a:lstStyle/>
+                    <a:p>
+                      <a:r>
+                        <a:rPr lang="fr-FR" dirty="0" smtClean="0"/>
+                        <a:t>250Md5_2_5</a:t>
+                      </a:r>
+                      <a:endParaRPr lang="en-GB" dirty="0"/>
+                    </a:p>
+                  </a:txBody>
+                  <a:tcPr/>
+                </a:tc>
+                <a:tc>
+                  <a:txBody>
+                    <a:bodyPr/>
+                    <a:lstStyle/>
+                    <a:p>
+                      <a:r>
+                        <a:rPr lang="fr-FR" dirty="0" smtClean="0"/>
+                        <a:t>61651</a:t>
+                      </a:r>
+                      <a:endParaRPr lang="en-GB" dirty="0"/>
+                    </a:p>
+                  </a:txBody>
+                  <a:tcPr/>
+                </a:tc>
+              </a:tr>
+              <a:tr h="370840">
+                <a:tc>
+                  <a:txBody>
+                    <a:bodyPr/>
+                    <a:lstStyle/>
+                    <a:p>
+                      <a:r>
+                        <a:rPr lang="fr-FR" dirty="0" smtClean="0"/>
+                        <a:t>100Md5_2_1</a:t>
+                      </a:r>
+                      <a:endParaRPr lang="en-GB" dirty="0"/>
+                    </a:p>
+                  </a:txBody>
+                  <a:tcPr/>
+                </a:tc>
+                <a:tc>
+                  <a:txBody>
+                    <a:bodyPr/>
+                    <a:lstStyle/>
+                    <a:p>
+                      <a:r>
+                        <a:rPr lang="fr-FR" dirty="0" smtClean="0"/>
+                        <a:t>30644</a:t>
+                      </a:r>
+                      <a:endParaRPr lang="en-GB" dirty="0"/>
+                    </a:p>
+                  </a:txBody>
+                  <a:tcPr/>
+                </a:tc>
+                <a:tc>
+                  <a:txBody>
+                    <a:bodyPr/>
+                    <a:lstStyle/>
+                    <a:p>
+                      <a:r>
+                        <a:rPr lang="fr-FR" dirty="0" smtClean="0"/>
+                        <a:t>500Md5_1_1</a:t>
+                      </a:r>
+                      <a:endParaRPr lang="en-GB" dirty="0"/>
+                    </a:p>
+                  </a:txBody>
+                  <a:tcPr/>
+                </a:tc>
+                <a:tc>
+                  <a:txBody>
+                    <a:bodyPr/>
+                    <a:lstStyle/>
+                    <a:p>
+                      <a:r>
+                        <a:rPr lang="fr-FR" dirty="0" smtClean="0"/>
+                        <a:t>177554</a:t>
+                      </a:r>
+                      <a:endParaRPr lang="en-GB" dirty="0"/>
+                    </a:p>
+                  </a:txBody>
+                  <a:tcPr/>
+                </a:tc>
+              </a:tr>
+              <a:tr h="370840">
+                <a:tc>
+                  <a:txBody>
+                    <a:bodyPr/>
+                    <a:lstStyle/>
+                    <a:p>
+                      <a:r>
+                        <a:rPr lang="fr-FR" dirty="0" smtClean="0"/>
+                        <a:t>100Md5_2_2</a:t>
+                      </a:r>
+                      <a:endParaRPr lang="en-GB" dirty="0"/>
+                    </a:p>
+                  </a:txBody>
+                  <a:tcPr/>
+                </a:tc>
+                <a:tc>
+                  <a:txBody>
+                    <a:bodyPr/>
+                    <a:lstStyle/>
+                    <a:p>
+                      <a:r>
+                        <a:rPr lang="fr-FR" dirty="0" smtClean="0"/>
+                        <a:t>27879</a:t>
+                      </a:r>
+                      <a:endParaRPr lang="en-GB" dirty="0"/>
+                    </a:p>
+                  </a:txBody>
+                  <a:tcPr/>
+                </a:tc>
+                <a:tc>
+                  <a:txBody>
+                    <a:bodyPr/>
+                    <a:lstStyle/>
+                    <a:p>
+                      <a:r>
+                        <a:rPr lang="fr-FR" dirty="0" smtClean="0"/>
+                        <a:t>500Md5_1_2</a:t>
+                      </a:r>
+                      <a:endParaRPr lang="en-GB" dirty="0"/>
+                    </a:p>
+                  </a:txBody>
+                  <a:tcPr/>
+                </a:tc>
+                <a:tc>
+                  <a:txBody>
+                    <a:bodyPr/>
+                    <a:lstStyle/>
+                    <a:p>
+                      <a:r>
+                        <a:rPr lang="fr-FR" dirty="0" smtClean="0"/>
+                        <a:t>146114</a:t>
+                      </a:r>
+                      <a:endParaRPr lang="en-GB" dirty="0"/>
+                    </a:p>
+                  </a:txBody>
+                  <a:tcPr/>
+                </a:tc>
+              </a:tr>
+              <a:tr h="370840">
+                <a:tc>
+                  <a:txBody>
+                    <a:bodyPr/>
+                    <a:lstStyle/>
+                    <a:p>
+                      <a:r>
+                        <a:rPr lang="fr-FR" dirty="0" smtClean="0"/>
+                        <a:t>100Md5_2_5</a:t>
+                      </a:r>
+                      <a:endParaRPr lang="en-GB" dirty="0"/>
+                    </a:p>
+                  </a:txBody>
+                  <a:tcPr/>
+                </a:tc>
+                <a:tc>
+                  <a:txBody>
+                    <a:bodyPr/>
+                    <a:lstStyle/>
+                    <a:p>
+                      <a:r>
+                        <a:rPr lang="fr-FR" dirty="0" smtClean="0"/>
+                        <a:t>26236</a:t>
+                      </a:r>
+                      <a:endParaRPr lang="en-GB" dirty="0"/>
+                    </a:p>
+                  </a:txBody>
+                  <a:tcPr/>
+                </a:tc>
+                <a:tc>
+                  <a:txBody>
+                    <a:bodyPr/>
+                    <a:lstStyle/>
+                    <a:p>
+                      <a:r>
+                        <a:rPr lang="fr-FR" dirty="0" smtClean="0"/>
+                        <a:t>500Md5_1_5</a:t>
+                      </a:r>
+                      <a:endParaRPr lang="en-GB" dirty="0"/>
+                    </a:p>
+                  </a:txBody>
+                  <a:tcPr/>
+                </a:tc>
+                <a:tc>
+                  <a:txBody>
+                    <a:bodyPr/>
+                    <a:lstStyle/>
+                    <a:p>
+                      <a:r>
+                        <a:rPr lang="fr-FR" dirty="0" smtClean="0"/>
+                        <a:t>136437</a:t>
+                      </a:r>
+                      <a:endParaRPr lang="en-GB" dirty="0"/>
+                    </a:p>
+                  </a:txBody>
+                  <a:tcPr/>
+                </a:tc>
+              </a:tr>
+              <a:tr h="370840">
+                <a:tc>
+                  <a:txBody>
+                    <a:bodyPr/>
+                    <a:lstStyle/>
+                    <a:p>
+                      <a:r>
+                        <a:rPr lang="fr-FR" dirty="0" smtClean="0"/>
+                        <a:t>250Md5_1_1</a:t>
+                      </a:r>
+                      <a:endParaRPr lang="en-GB" dirty="0"/>
+                    </a:p>
+                  </a:txBody>
+                  <a:tcPr/>
+                </a:tc>
+                <a:tc>
+                  <a:txBody>
+                    <a:bodyPr/>
+                    <a:lstStyle/>
+                    <a:p>
+                      <a:r>
+                        <a:rPr lang="fr-FR" dirty="0" smtClean="0"/>
+                        <a:t>90085</a:t>
+                      </a:r>
+                      <a:endParaRPr lang="en-GB" dirty="0"/>
+                    </a:p>
+                  </a:txBody>
+                  <a:tcPr/>
+                </a:tc>
+                <a:tc>
+                  <a:txBody>
+                    <a:bodyPr/>
+                    <a:lstStyle/>
+                    <a:p>
+                      <a:r>
+                        <a:rPr lang="fr-FR" dirty="0" smtClean="0"/>
+                        <a:t>500Md5_2_1</a:t>
+                      </a:r>
+                      <a:endParaRPr lang="en-GB" dirty="0"/>
+                    </a:p>
+                  </a:txBody>
+                  <a:tcPr/>
+                </a:tc>
+                <a:tc>
+                  <a:txBody>
+                    <a:bodyPr/>
+                    <a:lstStyle/>
+                    <a:p>
+                      <a:r>
+                        <a:rPr lang="fr-FR" dirty="0" smtClean="0"/>
+                        <a:t>180886</a:t>
+                      </a:r>
+                      <a:endParaRPr lang="en-GB" dirty="0"/>
+                    </a:p>
+                  </a:txBody>
+                  <a:tcPr/>
+                </a:tc>
+              </a:tr>
+              <a:tr h="370840">
+                <a:tc>
+                  <a:txBody>
+                    <a:bodyPr/>
+                    <a:lstStyle/>
+                    <a:p>
+                      <a:r>
+                        <a:rPr lang="fr-FR" dirty="0" smtClean="0"/>
+                        <a:t>250Md5_1_2</a:t>
+                      </a:r>
+                      <a:endParaRPr lang="en-GB" dirty="0"/>
+                    </a:p>
+                  </a:txBody>
+                  <a:tcPr/>
+                </a:tc>
+                <a:tc>
+                  <a:txBody>
+                    <a:bodyPr/>
+                    <a:lstStyle/>
+                    <a:p>
+                      <a:r>
+                        <a:rPr lang="fr-FR" dirty="0" smtClean="0"/>
+                        <a:t>79906</a:t>
+                      </a:r>
+                      <a:endParaRPr lang="en-GB" dirty="0"/>
+                    </a:p>
+                  </a:txBody>
+                  <a:tcPr/>
+                </a:tc>
+                <a:tc>
+                  <a:txBody>
+                    <a:bodyPr/>
+                    <a:lstStyle/>
+                    <a:p>
+                      <a:r>
+                        <a:rPr lang="fr-FR" dirty="0" smtClean="0"/>
+                        <a:t>500Md5_2_2</a:t>
+                      </a:r>
+                      <a:endParaRPr lang="en-GB" dirty="0"/>
+                    </a:p>
+                  </a:txBody>
+                  <a:tcPr/>
+                </a:tc>
+                <a:tc>
+                  <a:txBody>
+                    <a:bodyPr/>
+                    <a:lstStyle/>
+                    <a:p>
+                      <a:r>
+                        <a:rPr lang="fr-FR" dirty="0" smtClean="0"/>
+                        <a:t>161938</a:t>
+                      </a:r>
+                      <a:endParaRPr lang="en-GB" dirty="0"/>
+                    </a:p>
+                  </a:txBody>
+                  <a:tcPr/>
+                </a:tc>
+              </a:tr>
+              <a:tr h="370840">
+                <a:tc>
+                  <a:txBody>
+                    <a:bodyPr/>
+                    <a:lstStyle/>
+                    <a:p>
+                      <a:r>
+                        <a:rPr lang="fr-FR" dirty="0" smtClean="0"/>
+                        <a:t>250Md5_1_5</a:t>
+                      </a:r>
+                      <a:endParaRPr lang="en-GB" dirty="0"/>
+                    </a:p>
+                  </a:txBody>
+                  <a:tcPr/>
+                </a:tc>
+                <a:tc>
+                  <a:txBody>
+                    <a:bodyPr/>
+                    <a:lstStyle/>
+                    <a:p>
+                      <a:r>
+                        <a:rPr lang="fr-FR" dirty="0" smtClean="0"/>
+                        <a:t>68110</a:t>
+                      </a:r>
+                      <a:endParaRPr lang="en-GB" dirty="0"/>
+                    </a:p>
+                  </a:txBody>
+                  <a:tcPr/>
+                </a:tc>
+                <a:tc>
+                  <a:txBody>
+                    <a:bodyPr/>
+                    <a:lstStyle/>
+                    <a:p>
+                      <a:r>
+                        <a:rPr lang="fr-FR" dirty="0" smtClean="0"/>
+                        <a:t>500Md5_2_5</a:t>
+                      </a:r>
+                      <a:endParaRPr lang="en-GB" dirty="0"/>
+                    </a:p>
+                  </a:txBody>
+                  <a:tcPr/>
+                </a:tc>
+                <a:tc>
+                  <a:txBody>
+                    <a:bodyPr/>
+                    <a:lstStyle/>
+                    <a:p>
+                      <a:r>
+                        <a:rPr lang="fr-FR" dirty="0" smtClean="0"/>
+                        <a:t>161938</a:t>
+                      </a:r>
+                      <a:endParaRPr lang="en-GB" dirty="0"/>
+                    </a:p>
+                  </a:txBody>
+                  <a:tcPr/>
+                </a:tc>
+              </a:tr>
+            </a:tbl>
+          </a:graphicData>
+        </a:graphic>
+      </p:graphicFrame>
     </p:spTree>
     <p:extLst>
       <p:ext uri="{BB962C8B-B14F-4D97-AF65-F5344CB8AC3E}">
-        <p14:creationId xmlns:p14="http://schemas.microsoft.com/office/powerpoint/2010/main" val="1788104246"/>
+        <p14:creationId xmlns:p14="http://schemas.microsoft.com/office/powerpoint/2010/main" val="4016427617"/>
       </p:ext>
     </p:extLst>
   </p:cSld>
@@ -13006,7 +13625,7 @@
         <p:spPr/>
         <p:txBody>
           <a:bodyPr>
-            <a:normAutofit lnSpcReduction="10000"/>
+            <a:normAutofit/>
           </a:bodyPr>
           <a:lstStyle/>
           <a:p>
@@ -13045,13 +13664,11 @@
             <a:pPr lvl="1"/>
             <a:r>
               <a:rPr lang="fr-FR" dirty="0" smtClean="0"/>
-              <a:t>Améliorer la solution : Algorithme tabou</a:t>
-            </a:r>
-          </a:p>
-          <a:p>
+              <a:t>Améliorer la solution : Algorithme </a:t>
+            </a:r>
             <a:r>
               <a:rPr lang="fr-FR" dirty="0" smtClean="0"/>
-              <a:t>Difficultés</a:t>
+              <a:t>tabou</a:t>
             </a:r>
           </a:p>
           <a:p>
@@ -13059,6 +13676,7 @@
               <a:rPr lang="fr-FR" dirty="0" smtClean="0"/>
               <a:t>Résultats</a:t>
             </a:r>
+            <a:endParaRPr lang="fr-FR" dirty="0" smtClean="0"/>
           </a:p>
           <a:p>
             <a:r>
@@ -13307,11 +13925,11 @@
             <a:pPr lvl="1"/>
             <a:r>
               <a:rPr lang="fr-FR" dirty="0" smtClean="0"/>
-              <a:t>Tableau à deux </a:t>
+              <a:t>Tableau à deux dimensions </a:t>
             </a:r>
             <a:r>
               <a:rPr lang="fr-FR" dirty="0" err="1" smtClean="0"/>
-              <a:t>dim</a:t>
+              <a:t>slack</a:t>
             </a:r>
             <a:endParaRPr lang="fr-FR" dirty="0" smtClean="0"/>
           </a:p>
@@ -13615,20 +14233,20 @@
             <a:pPr lvl="1"/>
             <a:r>
               <a:rPr lang="fr-FR" dirty="0" smtClean="0"/>
-              <a:t>Parcourir tous les voisins pour trouver le meilleur voisin </a:t>
-            </a:r>
-            <a:r>
-              <a:rPr lang="fr-FR" dirty="0" err="1" smtClean="0"/>
-              <a:t>amélioran</a:t>
+              <a:t>Parcourir tous les voisins pour trouver le meilleur voisin améliorant</a:t>
+            </a:r>
+          </a:p>
+          <a:p>
+            <a:pPr lvl="2"/>
+            <a:r>
+              <a:rPr lang="fr-FR" dirty="0" smtClean="0"/>
+              <a:t>Tentative d’échange </a:t>
+            </a:r>
+            <a:r>
+              <a:rPr lang="fr-FR" dirty="0" smtClean="0"/>
+              <a:t>entre 2 objets</a:t>
             </a:r>
             <a:endParaRPr lang="fr-FR" dirty="0" smtClean="0"/>
-          </a:p>
-          <a:p>
-            <a:pPr lvl="2"/>
-            <a:r>
-              <a:rPr lang="fr-FR" dirty="0" smtClean="0"/>
-              <a:t>Tentative d’échange entre tous les objets</a:t>
-            </a:r>
           </a:p>
           <a:p>
             <a:pPr marL="1524000" lvl="2"/>
@@ -13709,13 +14327,42 @@
           <a:p>
             <a:r>
               <a:rPr lang="fr-FR" dirty="0" smtClean="0"/>
-              <a:t>Plusieurs choix, algorithme tabou, algorithme génétique etc.</a:t>
+              <a:t>Plusieurs </a:t>
+            </a:r>
+            <a:r>
+              <a:rPr lang="fr-FR" dirty="0" smtClean="0"/>
+              <a:t>choix possibles, </a:t>
+            </a:r>
+            <a:r>
+              <a:rPr lang="fr-FR" dirty="0" smtClean="0"/>
+              <a:t>algorithme tabou, algorithme génétique etc.</a:t>
             </a:r>
           </a:p>
           <a:p>
             <a:r>
               <a:rPr lang="fr-FR" dirty="0" smtClean="0"/>
               <a:t>Implémentation de l’algorithme tabou</a:t>
+            </a:r>
+          </a:p>
+          <a:p>
+            <a:pPr lvl="1"/>
+            <a:r>
+              <a:rPr lang="fr-FR" dirty="0" smtClean="0"/>
+              <a:t>Dégrader la solution pour l’améliorer ensuite</a:t>
+            </a:r>
+          </a:p>
+          <a:p>
+            <a:pPr lvl="1"/>
+            <a:r>
+              <a:rPr lang="fr-FR" dirty="0" smtClean="0"/>
+              <a:t>Liste tabou (de 15 places)</a:t>
+            </a:r>
+          </a:p>
+          <a:p>
+            <a:pPr lvl="1"/>
+            <a:r>
+              <a:rPr lang="fr-FR" dirty="0" smtClean="0"/>
+              <a:t>3000 itérations sans amélioration pour stop</a:t>
             </a:r>
             <a:endParaRPr lang="en-GB" dirty="0"/>
           </a:p>
@@ -13789,7 +14436,24 @@
           <a:bodyPr/>
           <a:lstStyle/>
           <a:p>
-            <a:endParaRPr lang="en-GB"/>
+            <a:r>
+              <a:rPr lang="fr-FR" dirty="0" smtClean="0"/>
+              <a:t>Fuites mémoires</a:t>
+            </a:r>
+          </a:p>
+          <a:p>
+            <a:r>
+              <a:rPr lang="fr-FR" dirty="0" smtClean="0"/>
+              <a:t>Programme récursif</a:t>
+            </a:r>
+          </a:p>
+          <a:p>
+            <a:pPr marL="1257300"/>
+            <a:r>
+              <a:rPr lang="fr-FR" dirty="0" smtClean="0"/>
+              <a:t>Solution =&gt; Transformer le programme en programme itératif</a:t>
+            </a:r>
+            <a:endParaRPr lang="en-GB" dirty="0"/>
           </a:p>
         </p:txBody>
       </p:sp>

</xml_diff>